<commit_message>
Add to Unit 2 PowerPoint
</commit_message>
<xml_diff>
--- a/01-Primitive-Types/PowerPoints/01_HelloWorldWhitespaceConventions.pptx
+++ b/01-Primitive-Types/PowerPoints/01_HelloWorldWhitespaceConventions.pptx
@@ -227,7 +227,7 @@
           <a:p>
             <a:fld id="{6BE60906-66D1-4B26-B813-18E8CE13C820}" type="datetimeFigureOut">
               <a:rPr lang="en-US" smtClean="0"/>
-              <a:t>8/3/2020</a:t>
+              <a:t>1/18/2021</a:t>
             </a:fld>
             <a:endParaRPr lang="en-US"/>
           </a:p>
@@ -3639,7 +3639,7 @@
           <a:p>
             <a:fld id="{816DD38A-BD5D-446A-AEBD-FC3DDED4FB5C}" type="datetimeFigureOut">
               <a:rPr lang="en-US" smtClean="0"/>
-              <a:t>8/3/2020</a:t>
+              <a:t>1/18/2021</a:t>
             </a:fld>
             <a:endParaRPr lang="en-US"/>
           </a:p>
@@ -3847,7 +3847,7 @@
           <a:p>
             <a:fld id="{816DD38A-BD5D-446A-AEBD-FC3DDED4FB5C}" type="datetimeFigureOut">
               <a:rPr lang="en-US" smtClean="0"/>
-              <a:t>8/3/2020</a:t>
+              <a:t>1/18/2021</a:t>
             </a:fld>
             <a:endParaRPr lang="en-US"/>
           </a:p>
@@ -4103,7 +4103,7 @@
           <a:p>
             <a:fld id="{816DD38A-BD5D-446A-AEBD-FC3DDED4FB5C}" type="datetimeFigureOut">
               <a:rPr lang="en-US" smtClean="0"/>
-              <a:t>8/3/2020</a:t>
+              <a:t>1/18/2021</a:t>
             </a:fld>
             <a:endParaRPr lang="en-US"/>
           </a:p>
@@ -4277,7 +4277,7 @@
           <a:p>
             <a:fld id="{816DD38A-BD5D-446A-AEBD-FC3DDED4FB5C}" type="datetimeFigureOut">
               <a:rPr lang="en-US" smtClean="0"/>
-              <a:t>8/3/2020</a:t>
+              <a:t>1/18/2021</a:t>
             </a:fld>
             <a:endParaRPr lang="en-US"/>
           </a:p>
@@ -4620,7 +4620,7 @@
           <a:p>
             <a:fld id="{816DD38A-BD5D-446A-AEBD-FC3DDED4FB5C}" type="datetimeFigureOut">
               <a:rPr lang="en-US" smtClean="0"/>
-              <a:t>8/3/2020</a:t>
+              <a:t>1/18/2021</a:t>
             </a:fld>
             <a:endParaRPr lang="en-US"/>
           </a:p>
@@ -4895,7 +4895,7 @@
           <a:p>
             <a:fld id="{816DD38A-BD5D-446A-AEBD-FC3DDED4FB5C}" type="datetimeFigureOut">
               <a:rPr lang="en-US" smtClean="0"/>
-              <a:t>8/3/2020</a:t>
+              <a:t>1/18/2021</a:t>
             </a:fld>
             <a:endParaRPr lang="en-US"/>
           </a:p>
@@ -5274,7 +5274,7 @@
           <a:p>
             <a:fld id="{816DD38A-BD5D-446A-AEBD-FC3DDED4FB5C}" type="datetimeFigureOut">
               <a:rPr lang="en-US" smtClean="0"/>
-              <a:t>8/3/2020</a:t>
+              <a:t>1/18/2021</a:t>
             </a:fld>
             <a:endParaRPr lang="en-US"/>
           </a:p>
@@ -5392,7 +5392,7 @@
           <a:p>
             <a:fld id="{816DD38A-BD5D-446A-AEBD-FC3DDED4FB5C}" type="datetimeFigureOut">
               <a:rPr lang="en-US" smtClean="0"/>
-              <a:t>8/3/2020</a:t>
+              <a:t>1/18/2021</a:t>
             </a:fld>
             <a:endParaRPr lang="en-US"/>
           </a:p>
@@ -5563,7 +5563,7 @@
           <a:p>
             <a:fld id="{816DD38A-BD5D-446A-AEBD-FC3DDED4FB5C}" type="datetimeFigureOut">
               <a:rPr lang="en-US" smtClean="0"/>
-              <a:t>8/3/2020</a:t>
+              <a:t>1/18/2021</a:t>
             </a:fld>
             <a:endParaRPr lang="en-US"/>
           </a:p>
@@ -5917,7 +5917,7 @@
           <a:p>
             <a:fld id="{816DD38A-BD5D-446A-AEBD-FC3DDED4FB5C}" type="datetimeFigureOut">
               <a:rPr lang="en-US" smtClean="0"/>
-              <a:t>8/3/2020</a:t>
+              <a:t>1/18/2021</a:t>
             </a:fld>
             <a:endParaRPr lang="en-US"/>
           </a:p>
@@ -6299,7 +6299,7 @@
           <a:p>
             <a:fld id="{816DD38A-BD5D-446A-AEBD-FC3DDED4FB5C}" type="datetimeFigureOut">
               <a:rPr lang="en-US" smtClean="0"/>
-              <a:t>8/3/2020</a:t>
+              <a:t>1/18/2021</a:t>
             </a:fld>
             <a:endParaRPr lang="en-US"/>
           </a:p>
@@ -6586,7 +6586,7 @@
           <a:p>
             <a:fld id="{816DD38A-BD5D-446A-AEBD-FC3DDED4FB5C}" type="datetimeFigureOut">
               <a:rPr lang="en-US" smtClean="0"/>
-              <a:t>8/3/2020</a:t>
+              <a:t>1/18/2021</a:t>
             </a:fld>
             <a:endParaRPr lang="en-US"/>
           </a:p>
@@ -11280,59 +11280,6 @@
 </file>
 
 <file path=customXml/item2.xml><?xml version="1.0" encoding="utf-8"?>
-<p:properties xmlns:p="http://schemas.microsoft.com/office/2006/metadata/properties" xmlns:xsi="http://www.w3.org/2001/XMLSchema-instance" xmlns:pc="http://schemas.microsoft.com/office/infopath/2007/PartnerControls">
-  <documentManagement>
-    <Invited_Students xmlns="82256a1b-9f38-4c4c-91e5-29854cada989" xsi:nil="true"/>
-    <_ip_UnifiedCompliancePolicyUIAction xmlns="http://schemas.microsoft.com/sharepoint/v3" xsi:nil="true"/>
-    <CultureName xmlns="82256a1b-9f38-4c4c-91e5-29854cada989" xsi:nil="true"/>
-    <Students xmlns="82256a1b-9f38-4c4c-91e5-29854cada989">
-      <UserInfo>
-        <DisplayName/>
-        <AccountId xsi:nil="true"/>
-        <AccountType/>
-      </UserInfo>
-    </Students>
-    <Templates xmlns="82256a1b-9f38-4c4c-91e5-29854cada989" xsi:nil="true"/>
-    <Owner xmlns="82256a1b-9f38-4c4c-91e5-29854cada989">
-      <UserInfo>
-        <DisplayName/>
-        <AccountId xsi:nil="true"/>
-        <AccountType/>
-      </UserInfo>
-    </Owner>
-    <Teachers xmlns="82256a1b-9f38-4c4c-91e5-29854cada989">
-      <UserInfo>
-        <DisplayName/>
-        <AccountId xsi:nil="true"/>
-        <AccountType/>
-      </UserInfo>
-    </Teachers>
-    <Student_Groups xmlns="82256a1b-9f38-4c4c-91e5-29854cada989">
-      <UserInfo>
-        <DisplayName/>
-        <AccountId xsi:nil="true"/>
-        <AccountType/>
-      </UserInfo>
-    </Student_Groups>
-    <Distribution_Groups xmlns="82256a1b-9f38-4c4c-91e5-29854cada989" xsi:nil="true"/>
-    <Is_Collaboration_Space_Locked xmlns="82256a1b-9f38-4c4c-91e5-29854cada989" xsi:nil="true"/>
-    <Invited_Teachers xmlns="82256a1b-9f38-4c4c-91e5-29854cada989" xsi:nil="true"/>
-    <LMS_Mappings xmlns="82256a1b-9f38-4c4c-91e5-29854cada989" xsi:nil="true"/>
-    <NotebookType xmlns="82256a1b-9f38-4c4c-91e5-29854cada989" xsi:nil="true"/>
-    <_ip_UnifiedCompliancePolicyProperties xmlns="http://schemas.microsoft.com/sharepoint/v3" xsi:nil="true"/>
-    <Has_Teacher_Only_SectionGroup xmlns="82256a1b-9f38-4c4c-91e5-29854cada989" xsi:nil="true"/>
-    <Math_Settings xmlns="82256a1b-9f38-4c4c-91e5-29854cada989" xsi:nil="true"/>
-    <DefaultSectionNames xmlns="82256a1b-9f38-4c4c-91e5-29854cada989" xsi:nil="true"/>
-    <AppVersion xmlns="82256a1b-9f38-4c4c-91e5-29854cada989" xsi:nil="true"/>
-    <FolderType xmlns="82256a1b-9f38-4c4c-91e5-29854cada989" xsi:nil="true"/>
-    <TeamsChannelId xmlns="82256a1b-9f38-4c4c-91e5-29854cada989" xsi:nil="true"/>
-    <IsNotebookLocked xmlns="82256a1b-9f38-4c4c-91e5-29854cada989" xsi:nil="true"/>
-    <Self_Registration_Enabled xmlns="82256a1b-9f38-4c4c-91e5-29854cada989" xsi:nil="true"/>
-  </documentManagement>
-</p:properties>
-</file>
-
-<file path=customXml/item3.xml><?xml version="1.0" encoding="utf-8"?>
 <ct:contentTypeSchema xmlns:ct="http://schemas.microsoft.com/office/2006/metadata/contentType" xmlns:ma="http://schemas.microsoft.com/office/2006/metadata/properties/metaAttributes" ct:_="" ma:_="" ma:contentTypeName="Document" ma:contentTypeID="0x010100AC977DB636FAC046B39EFB0EDCA79FB9" ma:contentTypeVersion="35" ma:contentTypeDescription="Create a new document." ma:contentTypeScope="" ma:versionID="0f64df24c85279f01587ad2aa5aed291">
   <xsd:schema xmlns:xsd="http://www.w3.org/2001/XMLSchema" xmlns:xs="http://www.w3.org/2001/XMLSchema" xmlns:p="http://schemas.microsoft.com/office/2006/metadata/properties" xmlns:ns1="http://schemas.microsoft.com/sharepoint/v3" xmlns:ns3="9e962e79-3fd0-4a6e-bcbc-b3738a4df2d9" xmlns:ns4="82256a1b-9f38-4c4c-91e5-29854cada989" targetNamespace="http://schemas.microsoft.com/office/2006/metadata/properties" ma:root="true" ma:fieldsID="86f674dd3b581b7c6038a385992766ca" ns1:_="" ns3:_="" ns4:_="">
     <xsd:import namespace="http://schemas.microsoft.com/sharepoint/v3"/>
@@ -11760,6 +11707,59 @@
 </ct:contentTypeSchema>
 </file>
 
+<file path=customXml/item3.xml><?xml version="1.0" encoding="utf-8"?>
+<p:properties xmlns:p="http://schemas.microsoft.com/office/2006/metadata/properties" xmlns:xsi="http://www.w3.org/2001/XMLSchema-instance" xmlns:pc="http://schemas.microsoft.com/office/infopath/2007/PartnerControls">
+  <documentManagement>
+    <Invited_Students xmlns="82256a1b-9f38-4c4c-91e5-29854cada989" xsi:nil="true"/>
+    <_ip_UnifiedCompliancePolicyUIAction xmlns="http://schemas.microsoft.com/sharepoint/v3" xsi:nil="true"/>
+    <CultureName xmlns="82256a1b-9f38-4c4c-91e5-29854cada989" xsi:nil="true"/>
+    <Students xmlns="82256a1b-9f38-4c4c-91e5-29854cada989">
+      <UserInfo>
+        <DisplayName/>
+        <AccountId xsi:nil="true"/>
+        <AccountType/>
+      </UserInfo>
+    </Students>
+    <Templates xmlns="82256a1b-9f38-4c4c-91e5-29854cada989" xsi:nil="true"/>
+    <Owner xmlns="82256a1b-9f38-4c4c-91e5-29854cada989">
+      <UserInfo>
+        <DisplayName/>
+        <AccountId xsi:nil="true"/>
+        <AccountType/>
+      </UserInfo>
+    </Owner>
+    <Teachers xmlns="82256a1b-9f38-4c4c-91e5-29854cada989">
+      <UserInfo>
+        <DisplayName/>
+        <AccountId xsi:nil="true"/>
+        <AccountType/>
+      </UserInfo>
+    </Teachers>
+    <Student_Groups xmlns="82256a1b-9f38-4c4c-91e5-29854cada989">
+      <UserInfo>
+        <DisplayName/>
+        <AccountId xsi:nil="true"/>
+        <AccountType/>
+      </UserInfo>
+    </Student_Groups>
+    <Distribution_Groups xmlns="82256a1b-9f38-4c4c-91e5-29854cada989" xsi:nil="true"/>
+    <Is_Collaboration_Space_Locked xmlns="82256a1b-9f38-4c4c-91e5-29854cada989" xsi:nil="true"/>
+    <Invited_Teachers xmlns="82256a1b-9f38-4c4c-91e5-29854cada989" xsi:nil="true"/>
+    <LMS_Mappings xmlns="82256a1b-9f38-4c4c-91e5-29854cada989" xsi:nil="true"/>
+    <NotebookType xmlns="82256a1b-9f38-4c4c-91e5-29854cada989" xsi:nil="true"/>
+    <_ip_UnifiedCompliancePolicyProperties xmlns="http://schemas.microsoft.com/sharepoint/v3" xsi:nil="true"/>
+    <Has_Teacher_Only_SectionGroup xmlns="82256a1b-9f38-4c4c-91e5-29854cada989" xsi:nil="true"/>
+    <Math_Settings xmlns="82256a1b-9f38-4c4c-91e5-29854cada989" xsi:nil="true"/>
+    <DefaultSectionNames xmlns="82256a1b-9f38-4c4c-91e5-29854cada989" xsi:nil="true"/>
+    <AppVersion xmlns="82256a1b-9f38-4c4c-91e5-29854cada989" xsi:nil="true"/>
+    <FolderType xmlns="82256a1b-9f38-4c4c-91e5-29854cada989" xsi:nil="true"/>
+    <TeamsChannelId xmlns="82256a1b-9f38-4c4c-91e5-29854cada989" xsi:nil="true"/>
+    <IsNotebookLocked xmlns="82256a1b-9f38-4c4c-91e5-29854cada989" xsi:nil="true"/>
+    <Self_Registration_Enabled xmlns="82256a1b-9f38-4c4c-91e5-29854cada989" xsi:nil="true"/>
+  </documentManagement>
+</p:properties>
+</file>
+
 <file path=customXml/itemProps1.xml><?xml version="1.0" encoding="utf-8"?>
 <ds:datastoreItem xmlns:ds="http://schemas.openxmlformats.org/officeDocument/2006/customXml" ds:itemID="{08512FF1-D09C-4F6F-9BB2-E7BD1119A95E}">
   <ds:schemaRefs>
@@ -11769,17 +11769,6 @@
 </file>
 
 <file path=customXml/itemProps2.xml><?xml version="1.0" encoding="utf-8"?>
-<ds:datastoreItem xmlns:ds="http://schemas.openxmlformats.org/officeDocument/2006/customXml" ds:itemID="{093ED77E-2BD7-4868-8CBC-5258691730CF}">
-  <ds:schemaRefs>
-    <ds:schemaRef ds:uri="http://schemas.microsoft.com/office/2006/metadata/properties"/>
-    <ds:schemaRef ds:uri="http://schemas.microsoft.com/office/infopath/2007/PartnerControls"/>
-    <ds:schemaRef ds:uri="82256a1b-9f38-4c4c-91e5-29854cada989"/>
-    <ds:schemaRef ds:uri="http://schemas.microsoft.com/sharepoint/v3"/>
-  </ds:schemaRefs>
-</ds:datastoreItem>
-</file>
-
-<file path=customXml/itemProps3.xml><?xml version="1.0" encoding="utf-8"?>
 <ds:datastoreItem xmlns:ds="http://schemas.openxmlformats.org/officeDocument/2006/customXml" ds:itemID="{9984A1E0-4B6D-4434-BF90-93C1F7AFE765}">
   <ds:schemaRefs>
     <ds:schemaRef ds:uri="http://schemas.microsoft.com/office/2006/metadata/contentType"/>
@@ -11797,4 +11786,15 @@
     <ds:schemaRef ds:uri="http://schemas.microsoft.com/internal/obd"/>
   </ds:schemaRefs>
 </ds:datastoreItem>
+</file>
+
+<file path=customXml/itemProps3.xml><?xml version="1.0" encoding="utf-8"?>
+<ds:datastoreItem xmlns:ds="http://schemas.openxmlformats.org/officeDocument/2006/customXml" ds:itemID="{093ED77E-2BD7-4868-8CBC-5258691730CF}">
+  <ds:schemaRefs>
+    <ds:schemaRef ds:uri="http://schemas.microsoft.com/office/2006/metadata/properties"/>
+    <ds:schemaRef ds:uri="http://schemas.microsoft.com/office/infopath/2007/PartnerControls"/>
+    <ds:schemaRef ds:uri="82256a1b-9f38-4c4c-91e5-29854cada989"/>
+    <ds:schemaRef ds:uri="http://schemas.microsoft.com/sharepoint/v3"/>
+  </ds:schemaRefs>
+</ds:datastoreItem>
 </file>
</xml_diff>